<commit_message>
Updated from Project Reunion to Windows App SDK (v. 1.0.0)
</commit_message>
<xml_diff>
--- a/Planning/látványterv.pptx
+++ b/Planning/látványterv.pptx
@@ -25,9 +25,10 @@
     <p:sldId id="280" r:id="rId19"/>
     <p:sldId id="261" r:id="rId20"/>
     <p:sldId id="257" r:id="rId21"/>
-    <p:sldId id="259" r:id="rId22"/>
-    <p:sldId id="270" r:id="rId23"/>
-    <p:sldId id="271" r:id="rId24"/>
+    <p:sldId id="282" r:id="rId22"/>
+    <p:sldId id="259" r:id="rId23"/>
+    <p:sldId id="270" r:id="rId24"/>
+    <p:sldId id="271" r:id="rId25"/>
   </p:sldIdLst>
   <p:sldSz cx="12192000" cy="6858000"/>
   <p:notesSz cx="6858000" cy="9144000"/>
@@ -4852,7 +4853,7 @@
           <a:p>
             <a:fld id="{C36CC8F2-73B3-46F3-9726-A154FD4D3F66}" type="datetimeFigureOut">
               <a:rPr lang="hu-HU" smtClean="0"/>
-              <a:t>2022. 02. 18.</a:t>
+              <a:t>2022. 02. 22.</a:t>
             </a:fld>
             <a:endParaRPr lang="hu-HU"/>
           </a:p>
@@ -5050,7 +5051,7 @@
           <a:p>
             <a:fld id="{C36CC8F2-73B3-46F3-9726-A154FD4D3F66}" type="datetimeFigureOut">
               <a:rPr lang="hu-HU" smtClean="0"/>
-              <a:t>2022. 02. 18.</a:t>
+              <a:t>2022. 02. 22.</a:t>
             </a:fld>
             <a:endParaRPr lang="hu-HU"/>
           </a:p>
@@ -5258,7 +5259,7 @@
           <a:p>
             <a:fld id="{C36CC8F2-73B3-46F3-9726-A154FD4D3F66}" type="datetimeFigureOut">
               <a:rPr lang="hu-HU" smtClean="0"/>
-              <a:t>2022. 02. 18.</a:t>
+              <a:t>2022. 02. 22.</a:t>
             </a:fld>
             <a:endParaRPr lang="hu-HU"/>
           </a:p>
@@ -5456,7 +5457,7 @@
           <a:p>
             <a:fld id="{C36CC8F2-73B3-46F3-9726-A154FD4D3F66}" type="datetimeFigureOut">
               <a:rPr lang="hu-HU" smtClean="0"/>
-              <a:t>2022. 02. 18.</a:t>
+              <a:t>2022. 02. 22.</a:t>
             </a:fld>
             <a:endParaRPr lang="hu-HU"/>
           </a:p>
@@ -5731,7 +5732,7 @@
           <a:p>
             <a:fld id="{C36CC8F2-73B3-46F3-9726-A154FD4D3F66}" type="datetimeFigureOut">
               <a:rPr lang="hu-HU" smtClean="0"/>
-              <a:t>2022. 02. 18.</a:t>
+              <a:t>2022. 02. 22.</a:t>
             </a:fld>
             <a:endParaRPr lang="hu-HU"/>
           </a:p>
@@ -5996,7 +5997,7 @@
           <a:p>
             <a:fld id="{C36CC8F2-73B3-46F3-9726-A154FD4D3F66}" type="datetimeFigureOut">
               <a:rPr lang="hu-HU" smtClean="0"/>
-              <a:t>2022. 02. 18.</a:t>
+              <a:t>2022. 02. 22.</a:t>
             </a:fld>
             <a:endParaRPr lang="hu-HU"/>
           </a:p>
@@ -6408,7 +6409,7 @@
           <a:p>
             <a:fld id="{C36CC8F2-73B3-46F3-9726-A154FD4D3F66}" type="datetimeFigureOut">
               <a:rPr lang="hu-HU" smtClean="0"/>
-              <a:t>2022. 02. 18.</a:t>
+              <a:t>2022. 02. 22.</a:t>
             </a:fld>
             <a:endParaRPr lang="hu-HU"/>
           </a:p>
@@ -6549,7 +6550,7 @@
           <a:p>
             <a:fld id="{C36CC8F2-73B3-46F3-9726-A154FD4D3F66}" type="datetimeFigureOut">
               <a:rPr lang="hu-HU" smtClean="0"/>
-              <a:t>2022. 02. 18.</a:t>
+              <a:t>2022. 02. 22.</a:t>
             </a:fld>
             <a:endParaRPr lang="hu-HU"/>
           </a:p>
@@ -6662,7 +6663,7 @@
           <a:p>
             <a:fld id="{C36CC8F2-73B3-46F3-9726-A154FD4D3F66}" type="datetimeFigureOut">
               <a:rPr lang="hu-HU" smtClean="0"/>
-              <a:t>2022. 02. 18.</a:t>
+              <a:t>2022. 02. 22.</a:t>
             </a:fld>
             <a:endParaRPr lang="hu-HU"/>
           </a:p>
@@ -6973,7 +6974,7 @@
           <a:p>
             <a:fld id="{C36CC8F2-73B3-46F3-9726-A154FD4D3F66}" type="datetimeFigureOut">
               <a:rPr lang="hu-HU" smtClean="0"/>
-              <a:t>2022. 02. 18.</a:t>
+              <a:t>2022. 02. 22.</a:t>
             </a:fld>
             <a:endParaRPr lang="hu-HU"/>
           </a:p>
@@ -7261,7 +7262,7 @@
           <a:p>
             <a:fld id="{C36CC8F2-73B3-46F3-9726-A154FD4D3F66}" type="datetimeFigureOut">
               <a:rPr lang="hu-HU" smtClean="0"/>
-              <a:t>2022. 02. 18.</a:t>
+              <a:t>2022. 02. 22.</a:t>
             </a:fld>
             <a:endParaRPr lang="hu-HU"/>
           </a:p>
@@ -7502,7 +7503,7 @@
           <a:p>
             <a:fld id="{C36CC8F2-73B3-46F3-9726-A154FD4D3F66}" type="datetimeFigureOut">
               <a:rPr lang="hu-HU" smtClean="0"/>
-              <a:t>2022. 02. 18.</a:t>
+              <a:t>2022. 02. 22.</a:t>
             </a:fld>
             <a:endParaRPr lang="hu-HU"/>
           </a:p>
@@ -16182,6 +16183,298 @@
           <a:chExt cx="0" cy="0"/>
         </a:xfrm>
       </p:grpSpPr>
+      <p:sp>
+        <p:nvSpPr>
+          <p:cNvPr id="2" name="Téglalap 1">
+            <a:extLst>
+              <a:ext uri="{FF2B5EF4-FFF2-40B4-BE49-F238E27FC236}">
+                <a16:creationId xmlns:a16="http://schemas.microsoft.com/office/drawing/2014/main" id="{BB5CC4AA-141C-412B-B913-55A9FBBB00AE}"/>
+              </a:ext>
+            </a:extLst>
+          </p:cNvPr>
+          <p:cNvSpPr/>
+          <p:nvPr/>
+        </p:nvSpPr>
+        <p:spPr>
+          <a:xfrm>
+            <a:off x="8661077" y="4398579"/>
+            <a:ext cx="5407572" cy="2695903"/>
+          </a:xfrm>
+          <a:prstGeom prst="rect">
+            <a:avLst/>
+          </a:prstGeom>
+        </p:spPr>
+        <p:style>
+          <a:lnRef idx="2">
+            <a:schemeClr val="accent1">
+              <a:shade val="50000"/>
+            </a:schemeClr>
+          </a:lnRef>
+          <a:fillRef idx="1">
+            <a:schemeClr val="accent1"/>
+          </a:fillRef>
+          <a:effectRef idx="0">
+            <a:schemeClr val="accent1"/>
+          </a:effectRef>
+          <a:fontRef idx="minor">
+            <a:schemeClr val="lt1"/>
+          </a:fontRef>
+        </p:style>
+        <p:txBody>
+          <a:bodyPr rtlCol="0" anchor="ctr"/>
+          <a:lstStyle/>
+          <a:p>
+            <a:pPr algn="ctr"/>
+            <a:endParaRPr lang="hu-HU"/>
+          </a:p>
+        </p:txBody>
+      </p:sp>
+      <p:sp>
+        <p:nvSpPr>
+          <p:cNvPr id="3" name="Téglalap: lekerekített 2">
+            <a:extLst>
+              <a:ext uri="{FF2B5EF4-FFF2-40B4-BE49-F238E27FC236}">
+                <a16:creationId xmlns:a16="http://schemas.microsoft.com/office/drawing/2014/main" id="{E5773F73-09B2-4F0B-B159-FFD1BF4627FF}"/>
+              </a:ext>
+            </a:extLst>
+          </p:cNvPr>
+          <p:cNvSpPr/>
+          <p:nvPr/>
+        </p:nvSpPr>
+        <p:spPr>
+          <a:xfrm>
+            <a:off x="2144110" y="675981"/>
+            <a:ext cx="6245911" cy="2753019"/>
+          </a:xfrm>
+          <a:prstGeom prst="roundRect">
+            <a:avLst>
+              <a:gd name="adj" fmla="val 20163"/>
+            </a:avLst>
+          </a:prstGeom>
+        </p:spPr>
+        <p:style>
+          <a:lnRef idx="2">
+            <a:schemeClr val="accent1">
+              <a:shade val="50000"/>
+            </a:schemeClr>
+          </a:lnRef>
+          <a:fillRef idx="1">
+            <a:schemeClr val="accent1"/>
+          </a:fillRef>
+          <a:effectRef idx="0">
+            <a:schemeClr val="accent1"/>
+          </a:effectRef>
+          <a:fontRef idx="minor">
+            <a:schemeClr val="lt1"/>
+          </a:fontRef>
+        </p:style>
+        <p:txBody>
+          <a:bodyPr rtlCol="0" anchor="ctr"/>
+          <a:lstStyle/>
+          <a:p>
+            <a:pPr algn="ctr"/>
+            <a:endParaRPr lang="hu-HU"/>
+          </a:p>
+        </p:txBody>
+      </p:sp>
+      <p:sp>
+        <p:nvSpPr>
+          <p:cNvPr id="4" name="Téglalap: lekerekített 3">
+            <a:extLst>
+              <a:ext uri="{FF2B5EF4-FFF2-40B4-BE49-F238E27FC236}">
+                <a16:creationId xmlns:a16="http://schemas.microsoft.com/office/drawing/2014/main" id="{6F1B407B-890B-4A06-B8C1-B8C990899FB6}"/>
+              </a:ext>
+            </a:extLst>
+          </p:cNvPr>
+          <p:cNvSpPr/>
+          <p:nvPr/>
+        </p:nvSpPr>
+        <p:spPr>
+          <a:xfrm>
+            <a:off x="1417320" y="675981"/>
+            <a:ext cx="1550471" cy="817539"/>
+          </a:xfrm>
+          <a:prstGeom prst="roundRect">
+            <a:avLst/>
+          </a:prstGeom>
+          <a:ln>
+            <a:noFill/>
+          </a:ln>
+        </p:spPr>
+        <p:style>
+          <a:lnRef idx="2">
+            <a:schemeClr val="accent1">
+              <a:shade val="50000"/>
+            </a:schemeClr>
+          </a:lnRef>
+          <a:fillRef idx="1">
+            <a:schemeClr val="accent1"/>
+          </a:fillRef>
+          <a:effectRef idx="0">
+            <a:schemeClr val="accent1"/>
+          </a:effectRef>
+          <a:fontRef idx="minor">
+            <a:schemeClr val="lt1"/>
+          </a:fontRef>
+        </p:style>
+        <p:txBody>
+          <a:bodyPr rtlCol="0" anchor="ctr"/>
+          <a:lstStyle/>
+          <a:p>
+            <a:pPr algn="ctr"/>
+            <a:endParaRPr lang="hu-HU"/>
+          </a:p>
+        </p:txBody>
+      </p:sp>
+      <p:sp>
+        <p:nvSpPr>
+          <p:cNvPr id="5" name="Téglalap: lekerekített 4">
+            <a:extLst>
+              <a:ext uri="{FF2B5EF4-FFF2-40B4-BE49-F238E27FC236}">
+                <a16:creationId xmlns:a16="http://schemas.microsoft.com/office/drawing/2014/main" id="{DBE770DE-6FB9-4B4C-A9FE-E84E260668E1}"/>
+              </a:ext>
+            </a:extLst>
+          </p:cNvPr>
+          <p:cNvSpPr/>
+          <p:nvPr/>
+        </p:nvSpPr>
+        <p:spPr>
+          <a:xfrm>
+            <a:off x="1691640" y="1356360"/>
+            <a:ext cx="1550471" cy="817539"/>
+          </a:xfrm>
+          <a:prstGeom prst="roundRect">
+            <a:avLst/>
+          </a:prstGeom>
+          <a:ln>
+            <a:noFill/>
+          </a:ln>
+        </p:spPr>
+        <p:style>
+          <a:lnRef idx="2">
+            <a:schemeClr val="accent1">
+              <a:shade val="50000"/>
+            </a:schemeClr>
+          </a:lnRef>
+          <a:fillRef idx="1">
+            <a:schemeClr val="accent1"/>
+          </a:fillRef>
+          <a:effectRef idx="0">
+            <a:schemeClr val="accent1"/>
+          </a:effectRef>
+          <a:fontRef idx="minor">
+            <a:schemeClr val="lt1"/>
+          </a:fontRef>
+        </p:style>
+        <p:txBody>
+          <a:bodyPr rtlCol="0" anchor="ctr"/>
+          <a:lstStyle/>
+          <a:p>
+            <a:pPr algn="ctr"/>
+            <a:endParaRPr lang="hu-HU"/>
+          </a:p>
+        </p:txBody>
+      </p:sp>
+      <p:sp>
+        <p:nvSpPr>
+          <p:cNvPr id="6" name="Szövegdoboz 5">
+            <a:extLst>
+              <a:ext uri="{FF2B5EF4-FFF2-40B4-BE49-F238E27FC236}">
+                <a16:creationId xmlns:a16="http://schemas.microsoft.com/office/drawing/2014/main" id="{4A33A39D-BF45-49F0-8322-1C0E8459D82C}"/>
+              </a:ext>
+            </a:extLst>
+          </p:cNvPr>
+          <p:cNvSpPr txBox="1"/>
+          <p:nvPr/>
+        </p:nvSpPr>
+        <p:spPr>
+          <a:xfrm>
+            <a:off x="1787837" y="1580463"/>
+            <a:ext cx="301686" cy="369332"/>
+          </a:xfrm>
+          <a:prstGeom prst="rect">
+            <a:avLst/>
+          </a:prstGeom>
+          <a:noFill/>
+        </p:spPr>
+        <p:txBody>
+          <a:bodyPr wrap="none" rtlCol="0">
+            <a:spAutoFit/>
+          </a:bodyPr>
+          <a:lstStyle/>
+          <a:p>
+            <a:r>
+              <a:rPr lang="hu-HU" dirty="0"/>
+              <a:t>1</a:t>
+            </a:r>
+          </a:p>
+        </p:txBody>
+      </p:sp>
+      <p:sp>
+        <p:nvSpPr>
+          <p:cNvPr id="7" name="Szövegdoboz 6">
+            <a:extLst>
+              <a:ext uri="{FF2B5EF4-FFF2-40B4-BE49-F238E27FC236}">
+                <a16:creationId xmlns:a16="http://schemas.microsoft.com/office/drawing/2014/main" id="{B793B252-FC8F-4ACE-BE5D-321A7E6DC5EE}"/>
+              </a:ext>
+            </a:extLst>
+          </p:cNvPr>
+          <p:cNvSpPr txBox="1"/>
+          <p:nvPr/>
+        </p:nvSpPr>
+        <p:spPr>
+          <a:xfrm>
+            <a:off x="1641441" y="900084"/>
+            <a:ext cx="301686" cy="369332"/>
+          </a:xfrm>
+          <a:prstGeom prst="rect">
+            <a:avLst/>
+          </a:prstGeom>
+          <a:noFill/>
+        </p:spPr>
+        <p:txBody>
+          <a:bodyPr wrap="none" rtlCol="0">
+            <a:spAutoFit/>
+          </a:bodyPr>
+          <a:lstStyle/>
+          <a:p>
+            <a:r>
+              <a:rPr lang="hu-HU" dirty="0"/>
+              <a:t>1</a:t>
+            </a:r>
+          </a:p>
+        </p:txBody>
+      </p:sp>
+    </p:spTree>
+    <p:extLst>
+      <p:ext uri="{BB962C8B-B14F-4D97-AF65-F5344CB8AC3E}">
+        <p14:creationId xmlns:p14="http://schemas.microsoft.com/office/powerpoint/2010/main" val="3598390093"/>
+      </p:ext>
+    </p:extLst>
+  </p:cSld>
+  <p:clrMapOvr>
+    <a:masterClrMapping/>
+  </p:clrMapOvr>
+</p:sld>
+</file>
+
+<file path=ppt/slides/slide22.xml><?xml version="1.0" encoding="utf-8"?>
+<p:sld xmlns:a="http://schemas.openxmlformats.org/drawingml/2006/main" xmlns:r="http://schemas.openxmlformats.org/officeDocument/2006/relationships" xmlns:p="http://schemas.openxmlformats.org/presentationml/2006/main">
+  <p:cSld>
+    <p:spTree>
+      <p:nvGrpSpPr>
+        <p:cNvPr id="1" name=""/>
+        <p:cNvGrpSpPr/>
+        <p:nvPr/>
+      </p:nvGrpSpPr>
+      <p:grpSpPr>
+        <a:xfrm>
+          <a:off x="0" y="0"/>
+          <a:ext cx="0" cy="0"/>
+          <a:chOff x="0" y="0"/>
+          <a:chExt cx="0" cy="0"/>
+        </a:xfrm>
+      </p:grpSpPr>
       <p:grpSp>
         <p:nvGrpSpPr>
           <p:cNvPr id="2" name="Csoportba foglalás 1">
@@ -16375,7 +16668,7 @@
 </p:sld>
 </file>
 
-<file path=ppt/slides/slide22.xml><?xml version="1.0" encoding="utf-8"?>
+<file path=ppt/slides/slide23.xml><?xml version="1.0" encoding="utf-8"?>
 <p:sld xmlns:a="http://schemas.openxmlformats.org/drawingml/2006/main" xmlns:r="http://schemas.openxmlformats.org/officeDocument/2006/relationships" xmlns:p="http://schemas.openxmlformats.org/presentationml/2006/main">
   <p:cSld>
     <p:spTree>
@@ -16826,7 +17119,7 @@
 </p:sld>
 </file>
 
-<file path=ppt/slides/slide23.xml><?xml version="1.0" encoding="utf-8"?>
+<file path=ppt/slides/slide24.xml><?xml version="1.0" encoding="utf-8"?>
 <p:sld xmlns:a="http://schemas.openxmlformats.org/drawingml/2006/main" xmlns:r="http://schemas.openxmlformats.org/officeDocument/2006/relationships" xmlns:p="http://schemas.openxmlformats.org/presentationml/2006/main">
   <p:cSld>
     <p:spTree>

</xml_diff>